<commit_message>
Dodat kod za autentikaciju i primeri za web api kontrolere.
</commit_message>
<xml_diff>
--- a/OData/OData.pptx
+++ b/OData/OData.pptx
@@ -10511,7 +10511,9 @@
         </p:nvSpPr>
         <p:spPr/>
         <p:txBody>
-          <a:bodyPr/>
+          <a:bodyPr>
+            <a:normAutofit lnSpcReduction="10000"/>
+          </a:bodyPr>
           <a:lstStyle/>
           <a:p>
             <a:r>
@@ -10530,6 +10532,18 @@
           </a:p>
           <a:p>
             <a:endParaRPr lang="sr-Latn-RS" dirty="0" smtClean="0"/>
+          </a:p>
+          <a:p>
+            <a:r>
+              <a:rPr lang="sr-Latn-RS" dirty="0" smtClean="0"/>
+              <a:t>Ime u EntitySet-u mora da  bude isto kao i ime kontrolera!</a:t>
+            </a:r>
+          </a:p>
+          <a:p>
+            <a:r>
+              <a:rPr lang="sr-Latn-RS" dirty="0" smtClean="0"/>
+              <a:t>Sa EntitySet se kreira Entity Data model potreban za metapodatke.</a:t>
+            </a:r>
           </a:p>
           <a:p>
             <a:endParaRPr lang="sr-Latn-RS" dirty="0" smtClean="0"/>
@@ -10588,7 +10602,7 @@
         </p:blipFill>
         <p:spPr>
           <a:xfrm>
-            <a:off x="2768600" y="2305644"/>
+            <a:off x="3098800" y="2153244"/>
             <a:ext cx="6451600" cy="2050456"/>
           </a:xfrm>
           <a:prstGeom prst="rect">

</xml_diff>